<commit_message>
Last Update 16-08-2018 16:04:08.74
</commit_message>
<xml_diff>
--- a/Slides/Unit 3/CS8392-U2-Exceptions.pptx
+++ b/Slides/Unit 3/CS8392-U2-Exceptions.pptx
@@ -7447,13 +7447,6 @@
   <p:clrMapOvr>
     <a:masterClrMapping/>
   </p:clrMapOvr>
-  <p:timing>
-    <p:tnLst>
-      <p:par>
-        <p:cTn id="1" dur="indefinite" restart="never" nodeType="tmRoot"/>
-      </p:par>
-    </p:tnLst>
-  </p:timing>
 </p:sld>
 </file>
 
@@ -8189,13 +8182,6 @@
   <p:clrMapOvr>
     <a:masterClrMapping/>
   </p:clrMapOvr>
-  <p:timing>
-    <p:tnLst>
-      <p:par>
-        <p:cTn id="1" dur="indefinite" restart="never" nodeType="tmRoot"/>
-      </p:par>
-    </p:tnLst>
-  </p:timing>
 </p:sld>
 </file>
 
@@ -9458,13 +9444,6 @@
   <p:clrMapOvr>
     <a:masterClrMapping/>
   </p:clrMapOvr>
-  <p:timing>
-    <p:tnLst>
-      <p:par>
-        <p:cTn id="1" dur="indefinite" restart="never" nodeType="tmRoot"/>
-      </p:par>
-    </p:tnLst>
-  </p:timing>
 </p:sld>
 </file>
 
@@ -9791,13 +9770,6 @@
   <p:clrMapOvr>
     <a:masterClrMapping/>
   </p:clrMapOvr>
-  <p:timing>
-    <p:tnLst>
-      <p:par>
-        <p:cTn id="1" dur="indefinite" restart="never" nodeType="tmRoot"/>
-      </p:par>
-    </p:tnLst>
-  </p:timing>
 </p:sld>
 </file>
 
@@ -10031,13 +10003,6 @@
   <p:clrMapOvr>
     <a:masterClrMapping/>
   </p:clrMapOvr>
-  <p:timing>
-    <p:tnLst>
-      <p:par>
-        <p:cTn id="1" dur="indefinite" restart="never" nodeType="tmRoot"/>
-      </p:par>
-    </p:tnLst>
-  </p:timing>
 </p:sld>
 </file>
 
@@ -10359,13 +10324,6 @@
   <p:clrMapOvr>
     <a:masterClrMapping/>
   </p:clrMapOvr>
-  <p:timing>
-    <p:tnLst>
-      <p:par>
-        <p:cTn id="1" dur="indefinite" restart="never" nodeType="tmRoot"/>
-      </p:par>
-    </p:tnLst>
-  </p:timing>
 </p:sld>
 </file>
 
@@ -11170,13 +11128,6 @@
   <p:clrMapOvr>
     <a:masterClrMapping/>
   </p:clrMapOvr>
-  <p:timing>
-    <p:tnLst>
-      <p:par>
-        <p:cTn id="1" dur="indefinite" restart="never" nodeType="tmRoot"/>
-      </p:par>
-    </p:tnLst>
-  </p:timing>
 </p:sld>
 </file>
 
@@ -11981,13 +11932,6 @@
   <p:clrMapOvr>
     <a:masterClrMapping/>
   </p:clrMapOvr>
-  <p:timing>
-    <p:tnLst>
-      <p:par>
-        <p:cTn id="1" dur="indefinite" restart="never" nodeType="tmRoot"/>
-      </p:par>
-    </p:tnLst>
-  </p:timing>
 </p:sld>
 </file>
 
@@ -12792,13 +12736,6 @@
   <p:clrMapOvr>
     <a:masterClrMapping/>
   </p:clrMapOvr>
-  <p:timing>
-    <p:tnLst>
-      <p:par>
-        <p:cTn id="1" dur="indefinite" restart="never" nodeType="tmRoot"/>
-      </p:par>
-    </p:tnLst>
-  </p:timing>
 </p:sld>
 </file>
 
@@ -13479,13 +13416,6 @@
   <p:clrMapOvr>
     <a:masterClrMapping/>
   </p:clrMapOvr>
-  <p:timing>
-    <p:tnLst>
-      <p:par>
-        <p:cTn id="1" dur="indefinite" restart="never" nodeType="tmRoot"/>
-      </p:par>
-    </p:tnLst>
-  </p:timing>
 </p:sld>
 </file>
 
@@ -14138,13 +14068,6 @@
   <p:clrMapOvr>
     <a:masterClrMapping/>
   </p:clrMapOvr>
-  <p:timing>
-    <p:tnLst>
-      <p:par>
-        <p:cTn id="1" dur="indefinite" restart="never" nodeType="tmRoot"/>
-      </p:par>
-    </p:tnLst>
-  </p:timing>
 </p:sld>
 </file>
 
@@ -14290,13 +14213,6 @@
   <p:clrMapOvr>
     <a:masterClrMapping/>
   </p:clrMapOvr>
-  <p:timing>
-    <p:tnLst>
-      <p:par>
-        <p:cTn id="1" dur="indefinite" restart="never" nodeType="tmRoot"/>
-      </p:par>
-    </p:tnLst>
-  </p:timing>
 </p:sld>
 </file>
 
@@ -15924,13 +15840,6 @@
   <p:clrMapOvr>
     <a:masterClrMapping/>
   </p:clrMapOvr>
-  <p:timing>
-    <p:tnLst>
-      <p:par>
-        <p:cTn id="1" dur="indefinite" restart="never" nodeType="tmRoot"/>
-      </p:par>
-    </p:tnLst>
-  </p:timing>
 </p:sld>
 </file>
 
@@ -16028,13 +15937,6 @@
   <p:clrMapOvr>
     <a:masterClrMapping/>
   </p:clrMapOvr>
-  <p:timing>
-    <p:tnLst>
-      <p:par>
-        <p:cTn id="1" dur="indefinite" restart="never" nodeType="tmRoot"/>
-      </p:par>
-    </p:tnLst>
-  </p:timing>
 </p:sld>
 </file>
 
@@ -16103,13 +16005,6 @@
   <p:clrMapOvr>
     <a:masterClrMapping/>
   </p:clrMapOvr>
-  <p:timing>
-    <p:tnLst>
-      <p:par>
-        <p:cTn id="1" dur="indefinite" restart="never" nodeType="tmRoot"/>
-      </p:par>
-    </p:tnLst>
-  </p:timing>
 </p:sld>
 </file>
 
@@ -16234,13 +16129,6 @@
   <p:clrMapOvr>
     <a:masterClrMapping/>
   </p:clrMapOvr>
-  <p:timing>
-    <p:tnLst>
-      <p:par>
-        <p:cTn id="1" dur="indefinite" restart="never" nodeType="tmRoot"/>
-      </p:par>
-    </p:tnLst>
-  </p:timing>
 </p:sld>
 </file>
 
@@ -16344,13 +16232,6 @@
   <p:clrMapOvr>
     <a:masterClrMapping/>
   </p:clrMapOvr>
-  <p:timing>
-    <p:tnLst>
-      <p:par>
-        <p:cTn id="1" dur="indefinite" restart="never" nodeType="tmRoot"/>
-      </p:par>
-    </p:tnLst>
-  </p:timing>
 </p:sld>
 </file>
 
@@ -17171,13 +17052,6 @@
   <p:clrMapOvr>
     <a:masterClrMapping/>
   </p:clrMapOvr>
-  <p:timing>
-    <p:tnLst>
-      <p:par>
-        <p:cTn id="1" dur="indefinite" restart="never" nodeType="tmRoot"/>
-      </p:par>
-    </p:tnLst>
-  </p:timing>
 </p:sld>
 </file>
 
@@ -17234,7 +17108,7 @@
         <p:spPr/>
         <p:txBody>
           <a:bodyPr>
-            <a:normAutofit lnSpcReduction="10000"/>
+            <a:normAutofit/>
           </a:bodyPr>
           <a:lstStyle/>
           <a:p>
@@ -17285,22 +17159,6 @@
               <a:rPr lang="en-US" dirty="0" smtClean="0"/>
               <a:t>Trying to open a file that doesn’t exist</a:t>
             </a:r>
-          </a:p>
-          <a:p>
-            <a:pPr lvl="1"/>
-            <a:r>
-              <a:rPr lang="en-US" dirty="0" smtClean="0"/>
-              <a:t>Trying to find a </a:t>
-            </a:r>
-            <a:r>
-              <a:rPr lang="en-US" sz="2400" dirty="0" smtClean="0"/>
-              <a:t>Class </a:t>
-            </a:r>
-            <a:r>
-              <a:rPr lang="en-US" dirty="0" smtClean="0"/>
-              <a:t>object for a string that does not denote an existing class</a:t>
-            </a:r>
-            <a:endParaRPr lang="en-US" dirty="0"/>
           </a:p>
         </p:txBody>
       </p:sp>
@@ -17309,13 +17167,6 @@
   <p:clrMapOvr>
     <a:masterClrMapping/>
   </p:clrMapOvr>
-  <p:timing>
-    <p:tnLst>
-      <p:par>
-        <p:cTn id="1" dur="indefinite" restart="never" nodeType="tmRoot"/>
-      </p:par>
-    </p:tnLst>
-  </p:timing>
 </p:sld>
 </file>
 

</xml_diff>